<commit_message>
Updated .gitignore RIA. Updated ifml diagram pureHTML.
</commit_message>
<xml_diff>
--- a/documentation/PureHTML_files_drawio/ifml.pptx
+++ b/documentation/PureHTML_files_drawio/ifml.pptx
@@ -104,6 +104,11 @@
       </a:defRPr>
     </a:lvl9pPr>
   </p:defaultTextStyle>
+  <p:extLst>
+    <p:ext uri="{EFAFB233-063F-42B5-8137-9DF3F51BA10A}">
+      <p15:sldGuideLst xmlns:p15="http://schemas.microsoft.com/office/powerpoint/2012/main"/>
+    </p:ext>
+  </p:extLst>
 </p:presentation>
 </file>
 
@@ -238,7 +243,7 @@
           <a:p>
             <a:fld id="{145D7EDD-6969-4786-8656-F49D272D6C74}" type="datetimeFigureOut">
               <a:rPr lang="it-IT" smtClean="0"/>
-              <a:t>29/05/2022</a:t>
+              <a:t>30/05/2022</a:t>
             </a:fld>
             <a:endParaRPr lang="it-IT"/>
           </a:p>
@@ -408,7 +413,7 @@
           <a:p>
             <a:fld id="{145D7EDD-6969-4786-8656-F49D272D6C74}" type="datetimeFigureOut">
               <a:rPr lang="it-IT" smtClean="0"/>
-              <a:t>29/05/2022</a:t>
+              <a:t>30/05/2022</a:t>
             </a:fld>
             <a:endParaRPr lang="it-IT"/>
           </a:p>
@@ -588,7 +593,7 @@
           <a:p>
             <a:fld id="{145D7EDD-6969-4786-8656-F49D272D6C74}" type="datetimeFigureOut">
               <a:rPr lang="it-IT" smtClean="0"/>
-              <a:t>29/05/2022</a:t>
+              <a:t>30/05/2022</a:t>
             </a:fld>
             <a:endParaRPr lang="it-IT"/>
           </a:p>
@@ -758,7 +763,7 @@
           <a:p>
             <a:fld id="{145D7EDD-6969-4786-8656-F49D272D6C74}" type="datetimeFigureOut">
               <a:rPr lang="it-IT" smtClean="0"/>
-              <a:t>29/05/2022</a:t>
+              <a:t>30/05/2022</a:t>
             </a:fld>
             <a:endParaRPr lang="it-IT"/>
           </a:p>
@@ -1002,7 +1007,7 @@
           <a:p>
             <a:fld id="{145D7EDD-6969-4786-8656-F49D272D6C74}" type="datetimeFigureOut">
               <a:rPr lang="it-IT" smtClean="0"/>
-              <a:t>29/05/2022</a:t>
+              <a:t>30/05/2022</a:t>
             </a:fld>
             <a:endParaRPr lang="it-IT"/>
           </a:p>
@@ -1234,7 +1239,7 @@
           <a:p>
             <a:fld id="{145D7EDD-6969-4786-8656-F49D272D6C74}" type="datetimeFigureOut">
               <a:rPr lang="it-IT" smtClean="0"/>
-              <a:t>29/05/2022</a:t>
+              <a:t>30/05/2022</a:t>
             </a:fld>
             <a:endParaRPr lang="it-IT"/>
           </a:p>
@@ -1601,7 +1606,7 @@
           <a:p>
             <a:fld id="{145D7EDD-6969-4786-8656-F49D272D6C74}" type="datetimeFigureOut">
               <a:rPr lang="it-IT" smtClean="0"/>
-              <a:t>29/05/2022</a:t>
+              <a:t>30/05/2022</a:t>
             </a:fld>
             <a:endParaRPr lang="it-IT"/>
           </a:p>
@@ -1719,7 +1724,7 @@
           <a:p>
             <a:fld id="{145D7EDD-6969-4786-8656-F49D272D6C74}" type="datetimeFigureOut">
               <a:rPr lang="it-IT" smtClean="0"/>
-              <a:t>29/05/2022</a:t>
+              <a:t>30/05/2022</a:t>
             </a:fld>
             <a:endParaRPr lang="it-IT"/>
           </a:p>
@@ -1814,7 +1819,7 @@
           <a:p>
             <a:fld id="{145D7EDD-6969-4786-8656-F49D272D6C74}" type="datetimeFigureOut">
               <a:rPr lang="it-IT" smtClean="0"/>
-              <a:t>29/05/2022</a:t>
+              <a:t>30/05/2022</a:t>
             </a:fld>
             <a:endParaRPr lang="it-IT"/>
           </a:p>
@@ -2091,7 +2096,7 @@
           <a:p>
             <a:fld id="{145D7EDD-6969-4786-8656-F49D272D6C74}" type="datetimeFigureOut">
               <a:rPr lang="it-IT" smtClean="0"/>
-              <a:t>29/05/2022</a:t>
+              <a:t>30/05/2022</a:t>
             </a:fld>
             <a:endParaRPr lang="it-IT"/>
           </a:p>
@@ -2348,7 +2353,7 @@
           <a:p>
             <a:fld id="{145D7EDD-6969-4786-8656-F49D272D6C74}" type="datetimeFigureOut">
               <a:rPr lang="it-IT" smtClean="0"/>
-              <a:t>29/05/2022</a:t>
+              <a:t>30/05/2022</a:t>
             </a:fld>
             <a:endParaRPr lang="it-IT"/>
           </a:p>
@@ -2561,7 +2566,7 @@
           <a:p>
             <a:fld id="{145D7EDD-6969-4786-8656-F49D272D6C74}" type="datetimeFigureOut">
               <a:rPr lang="it-IT" smtClean="0"/>
-              <a:t>29/05/2022</a:t>
+              <a:t>30/05/2022</a:t>
             </a:fld>
             <a:endParaRPr lang="it-IT"/>
           </a:p>
@@ -5314,7 +5319,7 @@
                 <a:cs typeface="Calibri"/>
                 <a:sym typeface="Calibri"/>
               </a:rPr>
-              <a:t>Product choice form</a:t>
+              <a:t>Product choice DropDown Menu</a:t>
             </a:r>
             <a:br>
               <a:rPr lang="es-419" sz="1200" dirty="0">
@@ -6995,7 +7000,7 @@
               <a:buNone/>
             </a:pPr>
             <a:r>
-              <a:rPr lang="es-419" sz="1100" dirty="0" err="1">
+              <a:rPr lang="es-419" sz="1100" dirty="0">
                 <a:solidFill>
                   <a:schemeClr val="dk1"/>
                 </a:solidFill>
@@ -7004,7 +7009,7 @@
                 <a:cs typeface="Calibri"/>
                 <a:sym typeface="Calibri"/>
               </a:rPr>
-              <a:t>submit</a:t>
+              <a:t>select</a:t>
             </a:r>
             <a:endParaRPr sz="1100" dirty="0">
               <a:solidFill>

</xml_diff>